<commit_message>
Update from friday review by Lynn
</commit_message>
<xml_diff>
--- a/MHDS/MHDS-alt-actorDiagram-and-processFlows.pptx
+++ b/MHDS/MHDS-alt-actorDiagram-and-processFlows.pptx
@@ -8,7 +8,7 @@
     <p:notesMasterId r:id="rId10"/>
   </p:notesMasterIdLst>
   <p:sldIdLst>
-    <p:sldId id="261" r:id="rId2"/>
+    <p:sldId id="265" r:id="rId2"/>
     <p:sldId id="257" r:id="rId3"/>
     <p:sldId id="258" r:id="rId4"/>
     <p:sldId id="260" r:id="rId5"/>
@@ -204,7 +204,7 @@
           <a:p>
             <a:fld id="{B6E70393-9288-DD48-A766-CD327F7EE613}" type="datetimeFigureOut">
               <a:rPr lang="en-US" smtClean="0"/>
-              <a:t>2/20/20</a:t>
+              <a:t>2/21/2020</a:t>
             </a:fld>
             <a:endParaRPr lang="en-US"/>
           </a:p>
@@ -545,7 +545,7 @@
     </p:spTree>
     <p:extLst>
       <p:ext uri="{BB962C8B-B14F-4D97-AF65-F5344CB8AC3E}">
-        <p14:creationId xmlns:p14="http://schemas.microsoft.com/office/powerpoint/2010/main" val="2000844280"/>
+        <p14:creationId xmlns:p14="http://schemas.microsoft.com/office/powerpoint/2010/main" val="3370427221"/>
       </p:ext>
     </p:extLst>
   </p:cSld>
@@ -702,7 +702,7 @@
           <a:p>
             <a:fld id="{4E390601-3E07-CF42-B623-D8BE419A4B6C}" type="datetimeFigureOut">
               <a:rPr lang="en-US" smtClean="0"/>
-              <a:t>2/20/20</a:t>
+              <a:t>2/21/2020</a:t>
             </a:fld>
             <a:endParaRPr lang="en-US"/>
           </a:p>
@@ -900,7 +900,7 @@
           <a:p>
             <a:fld id="{4E390601-3E07-CF42-B623-D8BE419A4B6C}" type="datetimeFigureOut">
               <a:rPr lang="en-US" smtClean="0"/>
-              <a:t>2/20/20</a:t>
+              <a:t>2/21/2020</a:t>
             </a:fld>
             <a:endParaRPr lang="en-US"/>
           </a:p>
@@ -1108,7 +1108,7 @@
           <a:p>
             <a:fld id="{4E390601-3E07-CF42-B623-D8BE419A4B6C}" type="datetimeFigureOut">
               <a:rPr lang="en-US" smtClean="0"/>
-              <a:t>2/20/20</a:t>
+              <a:t>2/21/2020</a:t>
             </a:fld>
             <a:endParaRPr lang="en-US"/>
           </a:p>
@@ -1306,7 +1306,7 @@
           <a:p>
             <a:fld id="{4E390601-3E07-CF42-B623-D8BE419A4B6C}" type="datetimeFigureOut">
               <a:rPr lang="en-US" smtClean="0"/>
-              <a:t>2/20/20</a:t>
+              <a:t>2/21/2020</a:t>
             </a:fld>
             <a:endParaRPr lang="en-US"/>
           </a:p>
@@ -1581,7 +1581,7 @@
           <a:p>
             <a:fld id="{4E390601-3E07-CF42-B623-D8BE419A4B6C}" type="datetimeFigureOut">
               <a:rPr lang="en-US" smtClean="0"/>
-              <a:t>2/20/20</a:t>
+              <a:t>2/21/2020</a:t>
             </a:fld>
             <a:endParaRPr lang="en-US"/>
           </a:p>
@@ -1846,7 +1846,7 @@
           <a:p>
             <a:fld id="{4E390601-3E07-CF42-B623-D8BE419A4B6C}" type="datetimeFigureOut">
               <a:rPr lang="en-US" smtClean="0"/>
-              <a:t>2/20/20</a:t>
+              <a:t>2/21/2020</a:t>
             </a:fld>
             <a:endParaRPr lang="en-US"/>
           </a:p>
@@ -2258,7 +2258,7 @@
           <a:p>
             <a:fld id="{4E390601-3E07-CF42-B623-D8BE419A4B6C}" type="datetimeFigureOut">
               <a:rPr lang="en-US" smtClean="0"/>
-              <a:t>2/20/20</a:t>
+              <a:t>2/21/2020</a:t>
             </a:fld>
             <a:endParaRPr lang="en-US"/>
           </a:p>
@@ -2399,7 +2399,7 @@
           <a:p>
             <a:fld id="{4E390601-3E07-CF42-B623-D8BE419A4B6C}" type="datetimeFigureOut">
               <a:rPr lang="en-US" smtClean="0"/>
-              <a:t>2/20/20</a:t>
+              <a:t>2/21/2020</a:t>
             </a:fld>
             <a:endParaRPr lang="en-US"/>
           </a:p>
@@ -2512,7 +2512,7 @@
           <a:p>
             <a:fld id="{4E390601-3E07-CF42-B623-D8BE419A4B6C}" type="datetimeFigureOut">
               <a:rPr lang="en-US" smtClean="0"/>
-              <a:t>2/20/20</a:t>
+              <a:t>2/21/2020</a:t>
             </a:fld>
             <a:endParaRPr lang="en-US"/>
           </a:p>
@@ -2823,7 +2823,7 @@
           <a:p>
             <a:fld id="{4E390601-3E07-CF42-B623-D8BE419A4B6C}" type="datetimeFigureOut">
               <a:rPr lang="en-US" smtClean="0"/>
-              <a:t>2/20/20</a:t>
+              <a:t>2/21/2020</a:t>
             </a:fld>
             <a:endParaRPr lang="en-US"/>
           </a:p>
@@ -3111,7 +3111,7 @@
           <a:p>
             <a:fld id="{4E390601-3E07-CF42-B623-D8BE419A4B6C}" type="datetimeFigureOut">
               <a:rPr lang="en-US" smtClean="0"/>
-              <a:t>2/20/20</a:t>
+              <a:t>2/21/2020</a:t>
             </a:fld>
             <a:endParaRPr lang="en-US"/>
           </a:p>
@@ -3352,7 +3352,7 @@
           <a:p>
             <a:fld id="{4E390601-3E07-CF42-B623-D8BE419A4B6C}" type="datetimeFigureOut">
               <a:rPr lang="en-US" smtClean="0"/>
-              <a:t>2/20/20</a:t>
+              <a:t>2/21/2020</a:t>
             </a:fld>
             <a:endParaRPr lang="en-US"/>
           </a:p>
@@ -3904,8 +3904,8 @@
         </p:nvSpPr>
         <p:spPr>
           <a:xfrm>
-            <a:off x="738364" y="2646765"/>
-            <a:ext cx="2301387" cy="2596957"/>
+            <a:off x="385370" y="2674564"/>
+            <a:ext cx="2786131" cy="2804541"/>
           </a:xfrm>
           <a:prstGeom prst="roundRect">
             <a:avLst/>
@@ -3964,8 +3964,8 @@
         </p:nvSpPr>
         <p:spPr>
           <a:xfrm>
-            <a:off x="4731954" y="3459270"/>
-            <a:ext cx="2679441" cy="3379461"/>
+            <a:off x="4677362" y="3575701"/>
+            <a:ext cx="2679441" cy="3263030"/>
           </a:xfrm>
           <a:prstGeom prst="roundRect">
             <a:avLst/>
@@ -4150,7 +4150,7 @@
         </p:nvSpPr>
         <p:spPr>
           <a:xfrm>
-            <a:off x="8915297" y="4835023"/>
+            <a:off x="8906983" y="5149784"/>
             <a:ext cx="2891969" cy="307777"/>
           </a:xfrm>
           <a:prstGeom prst="rect">
@@ -4190,7 +4190,7 @@
         </p:nvSpPr>
         <p:spPr>
           <a:xfrm>
-            <a:off x="8915297" y="5157404"/>
+            <a:off x="8915297" y="4828157"/>
             <a:ext cx="2891969" cy="307777"/>
           </a:xfrm>
           <a:prstGeom prst="rect">
@@ -4314,7 +4314,7 @@
         </p:nvSpPr>
         <p:spPr>
           <a:xfrm>
-            <a:off x="5062738" y="6081817"/>
+            <a:off x="5037730" y="6335784"/>
             <a:ext cx="2066523" cy="307777"/>
           </a:xfrm>
           <a:prstGeom prst="rect">
@@ -4355,7 +4355,7 @@
         </p:nvSpPr>
         <p:spPr>
           <a:xfrm>
-            <a:off x="5062738" y="6455063"/>
+            <a:off x="5049275" y="6005672"/>
             <a:ext cx="2066523" cy="307777"/>
           </a:xfrm>
           <a:prstGeom prst="rect">
@@ -4396,8 +4396,8 @@
         </p:nvSpPr>
         <p:spPr>
           <a:xfrm>
-            <a:off x="5054252" y="5463515"/>
-            <a:ext cx="2104623" cy="523220"/>
+            <a:off x="5054253" y="5463515"/>
+            <a:ext cx="2056568" cy="523220"/>
           </a:xfrm>
           <a:prstGeom prst="rect">
             <a:avLst/>
@@ -4571,15 +4571,14 @@
           </p:cNvPr>
           <p:cNvCxnSpPr>
             <a:cxnSpLocks/>
-            <a:stCxn id="10" idx="1"/>
             <a:endCxn id="17" idx="3"/>
           </p:cNvCxnSpPr>
           <p:nvPr/>
         </p:nvCxnSpPr>
         <p:spPr>
           <a:xfrm flipH="1">
-            <a:off x="7129261" y="4988912"/>
-            <a:ext cx="1786036" cy="1246794"/>
+            <a:off x="7104253" y="5471411"/>
+            <a:ext cx="3345666" cy="1018262"/>
           </a:xfrm>
           <a:prstGeom prst="straightConnector1">
             <a:avLst/>
@@ -4711,8 +4710,8 @@
         </p:nvCxnSpPr>
         <p:spPr>
           <a:xfrm flipH="1">
-            <a:off x="7158875" y="4546746"/>
-            <a:ext cx="1756422" cy="1178379"/>
+            <a:off x="7110821" y="4546746"/>
+            <a:ext cx="1804476" cy="1178379"/>
           </a:xfrm>
           <a:prstGeom prst="straightConnector1">
             <a:avLst/>
@@ -4755,8 +4754,8 @@
         </p:nvCxnSpPr>
         <p:spPr>
           <a:xfrm flipH="1">
-            <a:off x="7154370" y="5465181"/>
-            <a:ext cx="2779472" cy="1156137"/>
+            <a:off x="7120775" y="5081793"/>
+            <a:ext cx="1763474" cy="1048718"/>
           </a:xfrm>
           <a:prstGeom prst="straightConnector1">
             <a:avLst/>
@@ -4794,13 +4793,14 @@
           </p:cNvPr>
           <p:cNvCxnSpPr>
             <a:cxnSpLocks/>
+            <a:stCxn id="79" idx="3"/>
           </p:cNvCxnSpPr>
           <p:nvPr/>
         </p:nvCxnSpPr>
         <p:spPr>
           <a:xfrm flipV="1">
-            <a:off x="2923589" y="2309858"/>
-            <a:ext cx="5991708" cy="824603"/>
+            <a:off x="2909121" y="2309861"/>
+            <a:ext cx="6006176" cy="1070132"/>
           </a:xfrm>
           <a:prstGeom prst="straightConnector1">
             <a:avLst/>
@@ -4841,7 +4841,7 @@
         </p:nvSpPr>
         <p:spPr>
           <a:xfrm>
-            <a:off x="8114886" y="5385401"/>
+            <a:off x="7520552" y="6346881"/>
             <a:ext cx="1167131" cy="461665"/>
           </a:xfrm>
           <a:prstGeom prst="rect">
@@ -4857,23 +4857,17 @@
           <a:p>
             <a:r>
               <a:rPr lang="en-US" sz="1200" dirty="0"/>
-              <a:t>[ITI-19]</a:t>
-            </a:r>
-          </a:p>
-          <a:p>
-            <a:r>
-              <a:rPr lang="en-US" sz="1200" dirty="0"/>
-              <a:t>[ITI-20]</a:t>
-            </a:r>
-          </a:p>
-        </p:txBody>
-      </p:sp>
-      <p:sp>
-        <p:nvSpPr>
-          <p:cNvPr id="48" name="TextBox 47">
-            <a:extLst>
-              <a:ext uri="{FF2B5EF4-FFF2-40B4-BE49-F238E27FC236}">
-                <a16:creationId xmlns:a16="http://schemas.microsoft.com/office/drawing/2014/main" id="{820C6D69-7042-2547-89F7-D83DE9D88758}"/>
+              <a:t>[ITI-20] Record Audit Event</a:t>
+            </a:r>
+          </a:p>
+        </p:txBody>
+      </p:sp>
+      <p:sp>
+        <p:nvSpPr>
+          <p:cNvPr id="49" name="TextBox 48">
+            <a:extLst>
+              <a:ext uri="{FF2B5EF4-FFF2-40B4-BE49-F238E27FC236}">
+                <a16:creationId xmlns:a16="http://schemas.microsoft.com/office/drawing/2014/main" id="{BCE416A5-4BAB-9442-B03C-3251EEB0287B}"/>
               </a:ext>
             </a:extLst>
           </p:cNvPr>
@@ -4882,8 +4876,8 @@
         </p:nvSpPr>
         <p:spPr>
           <a:xfrm>
-            <a:off x="8360327" y="6015216"/>
-            <a:ext cx="1242989" cy="461665"/>
+            <a:off x="7719716" y="3641921"/>
+            <a:ext cx="1128795" cy="646331"/>
           </a:xfrm>
           <a:prstGeom prst="rect">
             <a:avLst/>
@@ -4898,17 +4892,17 @@
           <a:p>
             <a:r>
               <a:rPr lang="en-US" sz="1200" dirty="0"/>
-              <a:t>[ITI-1] Maintain Time</a:t>
-            </a:r>
-          </a:p>
-        </p:txBody>
-      </p:sp>
-      <p:sp>
-        <p:nvSpPr>
-          <p:cNvPr id="49" name="TextBox 48">
-            <a:extLst>
-              <a:ext uri="{FF2B5EF4-FFF2-40B4-BE49-F238E27FC236}">
-                <a16:creationId xmlns:a16="http://schemas.microsoft.com/office/drawing/2014/main" id="{BCE416A5-4BAB-9442-B03C-3251EEB0287B}"/>
+              <a:t>[ITI-93] Mobile Patient Identity Feed</a:t>
+            </a:r>
+          </a:p>
+        </p:txBody>
+      </p:sp>
+      <p:sp>
+        <p:nvSpPr>
+          <p:cNvPr id="58" name="TextBox 57">
+            <a:extLst>
+              <a:ext uri="{FF2B5EF4-FFF2-40B4-BE49-F238E27FC236}">
+                <a16:creationId xmlns:a16="http://schemas.microsoft.com/office/drawing/2014/main" id="{7BF6FEBE-A7FF-4944-89FE-6B0612FF48AC}"/>
               </a:ext>
             </a:extLst>
           </p:cNvPr>
@@ -4917,8 +4911,8 @@
         </p:nvSpPr>
         <p:spPr>
           <a:xfrm>
-            <a:off x="7584388" y="3477666"/>
-            <a:ext cx="1128795" cy="646331"/>
+            <a:off x="6547874" y="2706138"/>
+            <a:ext cx="2659410" cy="276999"/>
           </a:xfrm>
           <a:prstGeom prst="rect">
             <a:avLst/>
@@ -4933,17 +4927,17 @@
           <a:p>
             <a:r>
               <a:rPr lang="en-US" sz="1200" dirty="0"/>
-              <a:t>[ITI-93] Mobile Patient Identity Feed</a:t>
-            </a:r>
-          </a:p>
-        </p:txBody>
-      </p:sp>
-      <p:sp>
-        <p:nvSpPr>
-          <p:cNvPr id="58" name="TextBox 57">
-            <a:extLst>
-              <a:ext uri="{FF2B5EF4-FFF2-40B4-BE49-F238E27FC236}">
-                <a16:creationId xmlns:a16="http://schemas.microsoft.com/office/drawing/2014/main" id="{7BF6FEBE-A7FF-4944-89FE-6B0612FF48AC}"/>
+              <a:t>[ITI-71] Get Authorization Token</a:t>
+            </a:r>
+          </a:p>
+        </p:txBody>
+      </p:sp>
+      <p:sp>
+        <p:nvSpPr>
+          <p:cNvPr id="59" name="TextBox 58">
+            <a:extLst>
+              <a:ext uri="{FF2B5EF4-FFF2-40B4-BE49-F238E27FC236}">
+                <a16:creationId xmlns:a16="http://schemas.microsoft.com/office/drawing/2014/main" id="{E4338DDC-9FA1-D34F-9BBB-E2AB509BED02}"/>
               </a:ext>
             </a:extLst>
           </p:cNvPr>
@@ -4952,8 +4946,8 @@
         </p:nvSpPr>
         <p:spPr>
           <a:xfrm>
-            <a:off x="6438690" y="2719786"/>
-            <a:ext cx="2659410" cy="276999"/>
+            <a:off x="3105708" y="3872129"/>
+            <a:ext cx="1533552" cy="461665"/>
           </a:xfrm>
           <a:prstGeom prst="rect">
             <a:avLst/>
@@ -4968,17 +4962,33 @@
           <a:p>
             <a:r>
               <a:rPr lang="en-US" sz="1200" dirty="0"/>
-              <a:t>[ITI-71] Get Authorization Token</a:t>
-            </a:r>
-          </a:p>
-        </p:txBody>
-      </p:sp>
-      <p:sp>
-        <p:nvSpPr>
-          <p:cNvPr id="59" name="TextBox 58">
-            <a:extLst>
-              <a:ext uri="{FF2B5EF4-FFF2-40B4-BE49-F238E27FC236}">
-                <a16:creationId xmlns:a16="http://schemas.microsoft.com/office/drawing/2014/main" id="{E4338DDC-9FA1-D34F-9BBB-E2AB509BED02}"/>
+              <a:t>[ITI-78] or [ITI-83]  </a:t>
+            </a:r>
+            <a:r>
+              <a:rPr lang="en-US" sz="1200" dirty="0" err="1"/>
+              <a:t>PDQm</a:t>
+            </a:r>
+            <a:r>
+              <a:rPr lang="en-US" sz="1200" dirty="0"/>
+              <a:t> or </a:t>
+            </a:r>
+            <a:r>
+              <a:rPr lang="en-US" sz="1200" dirty="0" err="1"/>
+              <a:t>PIXm</a:t>
+            </a:r>
+            <a:r>
+              <a:rPr lang="en-US" sz="1200" dirty="0"/>
+              <a:t> Query</a:t>
+            </a:r>
+          </a:p>
+        </p:txBody>
+      </p:sp>
+      <p:sp>
+        <p:nvSpPr>
+          <p:cNvPr id="60" name="TextBox 59">
+            <a:extLst>
+              <a:ext uri="{FF2B5EF4-FFF2-40B4-BE49-F238E27FC236}">
+                <a16:creationId xmlns:a16="http://schemas.microsoft.com/office/drawing/2014/main" id="{05DCF846-1BFA-2B45-BED6-D93F4672027C}"/>
               </a:ext>
             </a:extLst>
           </p:cNvPr>
@@ -4987,8 +4997,8 @@
         </p:nvSpPr>
         <p:spPr>
           <a:xfrm>
-            <a:off x="3215060" y="4024960"/>
-            <a:ext cx="1533552" cy="461665"/>
+            <a:off x="7583860" y="4875540"/>
+            <a:ext cx="1265148" cy="668901"/>
           </a:xfrm>
           <a:prstGeom prst="rect">
             <a:avLst/>
@@ -5003,33 +5013,17 @@
           <a:p>
             <a:r>
               <a:rPr lang="en-US" sz="1200" dirty="0"/>
-              <a:t>[ITI-78] or [ITI-83]  </a:t>
-            </a:r>
-            <a:r>
-              <a:rPr lang="en-US" sz="1200" dirty="0" err="1"/>
-              <a:t>PDQm</a:t>
-            </a:r>
-            <a:r>
-              <a:rPr lang="en-US" sz="1200" dirty="0"/>
-              <a:t> or </a:t>
-            </a:r>
-            <a:r>
-              <a:rPr lang="en-US" sz="1200" dirty="0" err="1"/>
-              <a:t>PIXm</a:t>
-            </a:r>
-            <a:r>
-              <a:rPr lang="en-US" sz="1200" dirty="0"/>
-              <a:t> Query</a:t>
-            </a:r>
-          </a:p>
-        </p:txBody>
-      </p:sp>
-      <p:sp>
-        <p:nvSpPr>
-          <p:cNvPr id="60" name="TextBox 59">
-            <a:extLst>
-              <a:ext uri="{FF2B5EF4-FFF2-40B4-BE49-F238E27FC236}">
-                <a16:creationId xmlns:a16="http://schemas.microsoft.com/office/drawing/2014/main" id="{05DCF846-1BFA-2B45-BED6-D93F4672027C}"/>
+              <a:t>[ITI-90] Find Matching Care Services</a:t>
+            </a:r>
+          </a:p>
+        </p:txBody>
+      </p:sp>
+      <p:sp>
+        <p:nvSpPr>
+          <p:cNvPr id="61" name="TextBox 60">
+            <a:extLst>
+              <a:ext uri="{FF2B5EF4-FFF2-40B4-BE49-F238E27FC236}">
+                <a16:creationId xmlns:a16="http://schemas.microsoft.com/office/drawing/2014/main" id="{A9AE9888-0670-A44C-996F-A714ED9E2355}"/>
               </a:ext>
             </a:extLst>
           </p:cNvPr>
@@ -5038,8 +5032,8 @@
         </p:nvSpPr>
         <p:spPr>
           <a:xfrm>
-            <a:off x="7596530" y="4712205"/>
-            <a:ext cx="1265148" cy="668901"/>
+            <a:off x="7581041" y="4439566"/>
+            <a:ext cx="2351608" cy="276999"/>
           </a:xfrm>
           <a:prstGeom prst="rect">
             <a:avLst/>
@@ -5054,43 +5048,13 @@
           <a:p>
             <a:r>
               <a:rPr lang="en-US" sz="1200" dirty="0"/>
-              <a:t>[ITI-93] Find Matching Care Services</a:t>
-            </a:r>
-          </a:p>
-        </p:txBody>
-      </p:sp>
-      <p:sp>
-        <p:nvSpPr>
-          <p:cNvPr id="61" name="TextBox 60">
-            <a:extLst>
-              <a:ext uri="{FF2B5EF4-FFF2-40B4-BE49-F238E27FC236}">
-                <a16:creationId xmlns:a16="http://schemas.microsoft.com/office/drawing/2014/main" id="{A9AE9888-0670-A44C-996F-A714ED9E2355}"/>
-              </a:ext>
-            </a:extLst>
-          </p:cNvPr>
-          <p:cNvSpPr txBox="1"/>
-          <p:nvPr/>
-        </p:nvSpPr>
-        <p:spPr>
-          <a:xfrm>
-            <a:off x="8041288" y="4290764"/>
-            <a:ext cx="2066523" cy="276999"/>
-          </a:xfrm>
-          <a:prstGeom prst="rect">
-            <a:avLst/>
-          </a:prstGeom>
-          <a:noFill/>
-        </p:spPr>
-        <p:txBody>
-          <a:bodyPr wrap="square" rtlCol="0">
-            <a:spAutoFit/>
-          </a:bodyPr>
-          <a:lstStyle/>
-          <a:p>
-            <a:r>
-              <a:rPr lang="en-US" sz="1200" dirty="0"/>
-              <a:t>[ITI-xx]</a:t>
-            </a:r>
+              <a:t>[ITI-xx] SVCM </a:t>
+            </a:r>
+            <a:r>
+              <a:rPr lang="en-US" sz="1200" dirty="0" err="1"/>
+              <a:t>Qry</a:t>
+            </a:r>
+            <a:endParaRPr lang="en-US" sz="1200" dirty="0"/>
           </a:p>
         </p:txBody>
       </p:sp>
@@ -5225,14 +5189,15 @@
           </p:cNvPr>
           <p:cNvCxnSpPr>
             <a:cxnSpLocks/>
+            <a:stCxn id="80" idx="3"/>
             <a:endCxn id="20" idx="1"/>
           </p:cNvCxnSpPr>
           <p:nvPr/>
         </p:nvCxnSpPr>
         <p:spPr>
           <a:xfrm flipV="1">
-            <a:off x="2858433" y="3305731"/>
-            <a:ext cx="6056864" cy="208324"/>
+            <a:off x="2895427" y="3305731"/>
+            <a:ext cx="6019870" cy="336191"/>
           </a:xfrm>
           <a:prstGeom prst="straightConnector1">
             <a:avLst/>
@@ -5343,8 +5308,8 @@
         </p:nvSpPr>
         <p:spPr>
           <a:xfrm>
-            <a:off x="1900617" y="5710704"/>
-            <a:ext cx="2066523" cy="276999"/>
+            <a:off x="4002228" y="5395265"/>
+            <a:ext cx="2066523" cy="646331"/>
           </a:xfrm>
           <a:prstGeom prst="rect">
             <a:avLst/>
@@ -5359,7 +5324,19 @@
           <a:p>
             <a:r>
               <a:rPr lang="en-US" sz="1200" dirty="0"/>
-              <a:t>[ITI-1] Maintain Time</a:t>
+              <a:t>[ITI-1] </a:t>
+            </a:r>
+          </a:p>
+          <a:p>
+            <a:r>
+              <a:rPr lang="en-US" sz="1200" dirty="0"/>
+              <a:t>Maintain </a:t>
+            </a:r>
+          </a:p>
+          <a:p>
+            <a:r>
+              <a:rPr lang="en-US" sz="1200" dirty="0"/>
+              <a:t>Time</a:t>
             </a:r>
           </a:p>
         </p:txBody>
@@ -5419,7 +5396,7 @@
         </p:nvSpPr>
         <p:spPr>
           <a:xfrm>
-            <a:off x="6137804" y="3095182"/>
+            <a:off x="6219692" y="3122478"/>
             <a:ext cx="3087477" cy="276999"/>
           </a:xfrm>
           <a:prstGeom prst="rect">
@@ -5451,14 +5428,14 @@
           </p:cNvPr>
           <p:cNvCxnSpPr>
             <a:cxnSpLocks/>
-            <a:endCxn id="22" idx="1"/>
+            <a:stCxn id="83" idx="3"/>
           </p:cNvCxnSpPr>
           <p:nvPr/>
         </p:nvCxnSpPr>
         <p:spPr>
           <a:xfrm>
-            <a:off x="2904807" y="4058001"/>
-            <a:ext cx="2127071" cy="801676"/>
+            <a:off x="2908816" y="3919994"/>
+            <a:ext cx="2100688" cy="935340"/>
           </a:xfrm>
           <a:prstGeom prst="straightConnector1">
             <a:avLst/>
@@ -5501,8 +5478,8 @@
         </p:nvCxnSpPr>
         <p:spPr>
           <a:xfrm>
-            <a:off x="2070346" y="5092423"/>
-            <a:ext cx="2906477" cy="1516528"/>
+            <a:off x="1458132" y="5259836"/>
+            <a:ext cx="3606507" cy="1337478"/>
           </a:xfrm>
           <a:prstGeom prst="straightConnector1">
             <a:avLst/>
@@ -5540,14 +5517,13 @@
           </p:cNvPr>
           <p:cNvCxnSpPr>
             <a:cxnSpLocks/>
-            <a:endCxn id="124" idx="1"/>
           </p:cNvCxnSpPr>
           <p:nvPr/>
         </p:nvCxnSpPr>
         <p:spPr>
           <a:xfrm flipV="1">
-            <a:off x="2909121" y="2920255"/>
-            <a:ext cx="6006176" cy="477194"/>
+            <a:off x="2931287" y="2864022"/>
+            <a:ext cx="5984010" cy="723953"/>
           </a:xfrm>
           <a:prstGeom prst="straightConnector1">
             <a:avLst/>
@@ -5589,7 +5565,7 @@
         <p:spPr>
           <a:xfrm>
             <a:off x="332452" y="2621331"/>
-            <a:ext cx="2891969" cy="369332"/>
+            <a:ext cx="2891969" cy="646331"/>
           </a:xfrm>
           <a:prstGeom prst="rect">
             <a:avLst/>
@@ -5605,7 +5581,14 @@
             <a:pPr algn="ctr"/>
             <a:r>
               <a:rPr lang="en-US" b="1" dirty="0"/>
-              <a:t>HIE Doc Consumer</a:t>
+              <a:t>System that consumes</a:t>
+            </a:r>
+          </a:p>
+          <a:p>
+            <a:pPr algn="ctr"/>
+            <a:r>
+              <a:rPr lang="en-US" b="1" dirty="0"/>
+              <a:t>documents</a:t>
             </a:r>
           </a:p>
         </p:txBody>
@@ -5625,9 +5608,9 @@
           <p:nvPr/>
         </p:nvCxnSpPr>
         <p:spPr>
-          <a:xfrm flipV="1">
-            <a:off x="2923589" y="3713945"/>
-            <a:ext cx="601663" cy="25435"/>
+          <a:xfrm>
+            <a:off x="2921037" y="4816311"/>
+            <a:ext cx="2085408" cy="1408238"/>
           </a:xfrm>
           <a:prstGeom prst="straightConnector1">
             <a:avLst/>
@@ -5668,8 +5651,8 @@
         </p:nvSpPr>
         <p:spPr>
           <a:xfrm>
-            <a:off x="3449634" y="3413905"/>
-            <a:ext cx="2066523" cy="646331"/>
+            <a:off x="2974314" y="5268960"/>
+            <a:ext cx="1154624" cy="646331"/>
           </a:xfrm>
           <a:prstGeom prst="rect">
             <a:avLst/>
@@ -5684,7 +5667,7 @@
           <a:p>
             <a:r>
               <a:rPr lang="en-US" sz="1200" dirty="0"/>
-              <a:t>… [ITI-19] </a:t>
+              <a:t>… ITI-19] </a:t>
             </a:r>
             <a:br>
               <a:rPr lang="en-US" sz="1200" dirty="0"/>
@@ -5713,13 +5696,14 @@
           </p:cNvPr>
           <p:cNvCxnSpPr>
             <a:cxnSpLocks/>
+            <a:stCxn id="86" idx="3"/>
           </p:cNvCxnSpPr>
           <p:nvPr/>
         </p:nvCxnSpPr>
         <p:spPr>
           <a:xfrm>
-            <a:off x="2933150" y="4462798"/>
-            <a:ext cx="2076354" cy="848494"/>
+            <a:off x="2923300" y="4515137"/>
+            <a:ext cx="2070597" cy="1165282"/>
           </a:xfrm>
           <a:prstGeom prst="straightConnector1">
             <a:avLst/>
@@ -5748,41 +5732,6 @@
       </p:cxnSp>
       <p:sp>
         <p:nvSpPr>
-          <p:cNvPr id="82" name="TextBox 81">
-            <a:extLst>
-              <a:ext uri="{FF2B5EF4-FFF2-40B4-BE49-F238E27FC236}">
-                <a16:creationId xmlns:a16="http://schemas.microsoft.com/office/drawing/2014/main" id="{D02358D7-9224-0347-A1B4-78826EB76769}"/>
-              </a:ext>
-            </a:extLst>
-          </p:cNvPr>
-          <p:cNvSpPr txBox="1"/>
-          <p:nvPr/>
-        </p:nvSpPr>
-        <p:spPr>
-          <a:xfrm>
-            <a:off x="3426126" y="4914211"/>
-            <a:ext cx="2066523" cy="276999"/>
-          </a:xfrm>
-          <a:prstGeom prst="rect">
-            <a:avLst/>
-          </a:prstGeom>
-          <a:noFill/>
-        </p:spPr>
-        <p:txBody>
-          <a:bodyPr wrap="square" rtlCol="0">
-            <a:spAutoFit/>
-          </a:bodyPr>
-          <a:lstStyle/>
-          <a:p>
-            <a:r>
-              <a:rPr lang="en-US" sz="1200" dirty="0"/>
-              <a:t>[ITI-xx] </a:t>
-            </a:r>
-          </a:p>
-        </p:txBody>
-      </p:sp>
-      <p:sp>
-        <p:nvSpPr>
           <p:cNvPr id="104" name="Rounded Rectangle 103">
             <a:extLst>
               <a:ext uri="{FF2B5EF4-FFF2-40B4-BE49-F238E27FC236}">
@@ -5795,8 +5744,8 @@
         </p:nvSpPr>
         <p:spPr>
           <a:xfrm>
-            <a:off x="609999" y="137024"/>
-            <a:ext cx="2440425" cy="2429524"/>
+            <a:off x="83315" y="114638"/>
+            <a:ext cx="3418651" cy="2383263"/>
           </a:xfrm>
           <a:prstGeom prst="roundRect">
             <a:avLst/>
@@ -5855,7 +5804,7 @@
         </p:nvSpPr>
         <p:spPr>
           <a:xfrm>
-            <a:off x="862508" y="439168"/>
+            <a:off x="841342" y="439168"/>
             <a:ext cx="2020386" cy="276999"/>
           </a:xfrm>
           <a:prstGeom prst="rect">
@@ -5896,7 +5845,7 @@
         </p:nvSpPr>
         <p:spPr>
           <a:xfrm>
-            <a:off x="859235" y="703891"/>
+            <a:off x="841342" y="717539"/>
             <a:ext cx="2041560" cy="276999"/>
           </a:xfrm>
           <a:prstGeom prst="rect">
@@ -5937,7 +5886,7 @@
         </p:nvSpPr>
         <p:spPr>
           <a:xfrm>
-            <a:off x="845209" y="2170752"/>
+            <a:off x="841342" y="2170752"/>
             <a:ext cx="2086078" cy="281745"/>
           </a:xfrm>
           <a:prstGeom prst="rect">
@@ -5978,7 +5927,7 @@
         </p:nvSpPr>
         <p:spPr>
           <a:xfrm>
-            <a:off x="845208" y="1019135"/>
+            <a:off x="841342" y="1019135"/>
             <a:ext cx="2055587" cy="276999"/>
           </a:xfrm>
           <a:prstGeom prst="rect">
@@ -6031,8 +5980,8 @@
         </p:nvSpPr>
         <p:spPr>
           <a:xfrm>
-            <a:off x="396077" y="114638"/>
-            <a:ext cx="2891969" cy="369332"/>
+            <a:off x="-13644" y="114638"/>
+            <a:ext cx="3615592" cy="369332"/>
           </a:xfrm>
           <a:prstGeom prst="rect">
             <a:avLst/>
@@ -6048,7 +5997,7 @@
             <a:pPr algn="ctr"/>
             <a:r>
               <a:rPr lang="en-US" b="1" dirty="0"/>
-              <a:t>HIE Document Source</a:t>
+              <a:t>System that publishes documents</a:t>
             </a:r>
           </a:p>
         </p:txBody>
@@ -6108,7 +6057,7 @@
         </p:nvSpPr>
         <p:spPr>
           <a:xfrm>
-            <a:off x="846715" y="1324718"/>
+            <a:off x="841342" y="1324718"/>
             <a:ext cx="2069433" cy="276999"/>
           </a:xfrm>
           <a:prstGeom prst="rect">
@@ -6152,8 +6101,8 @@
         </p:nvCxnSpPr>
         <p:spPr>
           <a:xfrm>
-            <a:off x="2882894" y="577668"/>
-            <a:ext cx="6034131" cy="1230737"/>
+            <a:off x="2861728" y="577668"/>
+            <a:ext cx="6055297" cy="1230737"/>
           </a:xfrm>
           <a:prstGeom prst="straightConnector1">
             <a:avLst/>
@@ -6194,7 +6143,7 @@
         </p:nvSpPr>
         <p:spPr>
           <a:xfrm>
-            <a:off x="5991181" y="2175819"/>
+            <a:off x="4011035" y="2680394"/>
             <a:ext cx="2066523" cy="276999"/>
           </a:xfrm>
           <a:prstGeom prst="rect">
@@ -6316,7 +6265,7 @@
         </p:nvCxnSpPr>
         <p:spPr>
           <a:xfrm>
-            <a:off x="2959886" y="1965959"/>
+            <a:off x="2959886" y="2006903"/>
             <a:ext cx="692840" cy="15678"/>
           </a:xfrm>
           <a:prstGeom prst="straightConnector1">
@@ -6532,7 +6481,7 @@
           <a:p>
             <a:r>
               <a:rPr lang="en-US" sz="1200" dirty="0"/>
-              <a:t>[ITI-xx]</a:t>
+              <a:t>[ITI-xx] SVCM Query</a:t>
             </a:r>
           </a:p>
         </p:txBody>
@@ -6630,7 +6579,7 @@
         </p:nvSpPr>
         <p:spPr>
           <a:xfrm>
-            <a:off x="850525" y="1614278"/>
+            <a:off x="841342" y="1614278"/>
             <a:ext cx="2069433" cy="276999"/>
           </a:xfrm>
           <a:prstGeom prst="rect">
@@ -6736,7 +6685,7 @@
           <a:p>
             <a:r>
               <a:rPr lang="en-US" sz="1200" dirty="0"/>
-              <a:t>[ITI-93]</a:t>
+              <a:t>[ITI-90]</a:t>
             </a:r>
           </a:p>
         </p:txBody>
@@ -6755,8 +6704,8 @@
         </p:nvSpPr>
         <p:spPr>
           <a:xfrm>
-            <a:off x="870529" y="3015858"/>
-            <a:ext cx="2015052" cy="276999"/>
+            <a:off x="853867" y="3241493"/>
+            <a:ext cx="2055254" cy="276999"/>
           </a:xfrm>
           <a:prstGeom prst="rect">
             <a:avLst/>
@@ -6796,7 +6745,7 @@
         </p:nvSpPr>
         <p:spPr>
           <a:xfrm>
-            <a:off x="867256" y="3298702"/>
+            <a:off x="853867" y="3503422"/>
             <a:ext cx="2041560" cy="276999"/>
           </a:xfrm>
           <a:prstGeom prst="rect">
@@ -6837,7 +6786,7 @@
         </p:nvSpPr>
         <p:spPr>
           <a:xfrm>
-            <a:off x="853230" y="4777595"/>
+            <a:off x="841342" y="4683329"/>
             <a:ext cx="2050940" cy="276999"/>
           </a:xfrm>
           <a:prstGeom prst="rect">
@@ -6878,7 +6827,7 @@
         </p:nvSpPr>
         <p:spPr>
           <a:xfrm>
-            <a:off x="853229" y="3890674"/>
+            <a:off x="853229" y="3781494"/>
             <a:ext cx="2055587" cy="276999"/>
           </a:xfrm>
           <a:prstGeom prst="rect">
@@ -6931,7 +6880,7 @@
         </p:nvSpPr>
         <p:spPr>
           <a:xfrm>
-            <a:off x="860169" y="3596683"/>
+            <a:off x="841342" y="4972889"/>
             <a:ext cx="2048647" cy="276999"/>
           </a:xfrm>
           <a:prstGeom prst="rect">
@@ -6972,7 +6921,7 @@
         </p:nvSpPr>
         <p:spPr>
           <a:xfrm>
-            <a:off x="854736" y="4196257"/>
+            <a:off x="853867" y="4087077"/>
             <a:ext cx="2069433" cy="276999"/>
           </a:xfrm>
           <a:prstGeom prst="rect">
@@ -7013,7 +6962,7 @@
         </p:nvSpPr>
         <p:spPr>
           <a:xfrm>
-            <a:off x="858546" y="4485817"/>
+            <a:off x="853867" y="4376637"/>
             <a:ext cx="2069433" cy="276999"/>
           </a:xfrm>
           <a:prstGeom prst="rect">
@@ -7044,10 +6993,335 @@
           </a:p>
         </p:txBody>
       </p:sp>
+      <p:sp>
+        <p:nvSpPr>
+          <p:cNvPr id="87" name="TextBox 86">
+            <a:extLst>
+              <a:ext uri="{FF2B5EF4-FFF2-40B4-BE49-F238E27FC236}">
+                <a16:creationId xmlns:a16="http://schemas.microsoft.com/office/drawing/2014/main" id="{F18BFF8B-EEB3-1E47-86F2-C4EBB346A320}"/>
+              </a:ext>
+            </a:extLst>
+          </p:cNvPr>
+          <p:cNvSpPr txBox="1"/>
+          <p:nvPr/>
+        </p:nvSpPr>
+        <p:spPr>
+          <a:xfrm>
+            <a:off x="3174775" y="4704118"/>
+            <a:ext cx="1011446" cy="461665"/>
+          </a:xfrm>
+          <a:prstGeom prst="rect">
+            <a:avLst/>
+          </a:prstGeom>
+          <a:noFill/>
+        </p:spPr>
+        <p:txBody>
+          <a:bodyPr wrap="square" rtlCol="0">
+            <a:spAutoFit/>
+          </a:bodyPr>
+          <a:lstStyle/>
+          <a:p>
+            <a:r>
+              <a:rPr lang="en-US" sz="1200" dirty="0"/>
+              <a:t>[ITI-90] Find … Services</a:t>
+            </a:r>
+          </a:p>
+        </p:txBody>
+      </p:sp>
+      <p:sp>
+        <p:nvSpPr>
+          <p:cNvPr id="88" name="TextBox 87">
+            <a:extLst>
+              <a:ext uri="{FF2B5EF4-FFF2-40B4-BE49-F238E27FC236}">
+                <a16:creationId xmlns:a16="http://schemas.microsoft.com/office/drawing/2014/main" id="{6BDA5988-2563-4B47-BD57-AC6C50E2481B}"/>
+              </a:ext>
+            </a:extLst>
+          </p:cNvPr>
+          <p:cNvSpPr txBox="1"/>
+          <p:nvPr/>
+        </p:nvSpPr>
+        <p:spPr>
+          <a:xfrm>
+            <a:off x="3240626" y="6219085"/>
+            <a:ext cx="1167131" cy="461665"/>
+          </a:xfrm>
+          <a:prstGeom prst="rect">
+            <a:avLst/>
+          </a:prstGeom>
+          <a:noFill/>
+        </p:spPr>
+        <p:txBody>
+          <a:bodyPr wrap="square" rtlCol="0">
+            <a:spAutoFit/>
+          </a:bodyPr>
+          <a:lstStyle/>
+          <a:p>
+            <a:r>
+              <a:rPr lang="en-US" sz="1200" dirty="0"/>
+              <a:t>[ITI-20] Record Audit Event</a:t>
+            </a:r>
+          </a:p>
+        </p:txBody>
+      </p:sp>
+      <p:sp>
+        <p:nvSpPr>
+          <p:cNvPr id="101" name="TextBox 100">
+            <a:extLst>
+              <a:ext uri="{FF2B5EF4-FFF2-40B4-BE49-F238E27FC236}">
+                <a16:creationId xmlns:a16="http://schemas.microsoft.com/office/drawing/2014/main" id="{BFE7114A-125F-8346-AE00-434B4E9A0D1F}"/>
+              </a:ext>
+            </a:extLst>
+          </p:cNvPr>
+          <p:cNvSpPr txBox="1"/>
+          <p:nvPr/>
+        </p:nvSpPr>
+        <p:spPr>
+          <a:xfrm>
+            <a:off x="7347854" y="5892463"/>
+            <a:ext cx="2066523" cy="276999"/>
+          </a:xfrm>
+          <a:prstGeom prst="rect">
+            <a:avLst/>
+          </a:prstGeom>
+          <a:noFill/>
+        </p:spPr>
+        <p:txBody>
+          <a:bodyPr wrap="square" rtlCol="0">
+            <a:spAutoFit/>
+          </a:bodyPr>
+          <a:lstStyle/>
+          <a:p>
+            <a:r>
+              <a:rPr lang="en-US" sz="1200" dirty="0"/>
+              <a:t>[ITI-1] </a:t>
+            </a:r>
+          </a:p>
+        </p:txBody>
+      </p:sp>
+      <p:cxnSp>
+        <p:nvCxnSpPr>
+          <p:cNvPr id="109" name="Straight Arrow Connector 108">
+            <a:extLst>
+              <a:ext uri="{FF2B5EF4-FFF2-40B4-BE49-F238E27FC236}">
+                <a16:creationId xmlns:a16="http://schemas.microsoft.com/office/drawing/2014/main" id="{108A9E90-74A1-E94B-8649-7ACDEED82B3A}"/>
+              </a:ext>
+            </a:extLst>
+          </p:cNvPr>
+          <p:cNvCxnSpPr>
+            <a:cxnSpLocks/>
+          </p:cNvCxnSpPr>
+          <p:nvPr/>
+        </p:nvCxnSpPr>
+        <p:spPr>
+          <a:xfrm>
+            <a:off x="2948733" y="4286711"/>
+            <a:ext cx="2085609" cy="977011"/>
+          </a:xfrm>
+          <a:prstGeom prst="straightConnector1">
+            <a:avLst/>
+          </a:prstGeom>
+          <a:ln w="12700">
+            <a:solidFill>
+              <a:schemeClr val="tx1"/>
+            </a:solidFill>
+            <a:tailEnd type="triangle" w="lg" len="med"/>
+          </a:ln>
+        </p:spPr>
+        <p:style>
+          <a:lnRef idx="1">
+            <a:schemeClr val="accent1"/>
+          </a:lnRef>
+          <a:fillRef idx="0">
+            <a:schemeClr val="accent1"/>
+          </a:fillRef>
+          <a:effectRef idx="0">
+            <a:schemeClr val="accent1"/>
+          </a:effectRef>
+          <a:fontRef idx="minor">
+            <a:schemeClr val="tx1"/>
+          </a:fontRef>
+        </p:style>
+      </p:cxnSp>
+      <p:sp>
+        <p:nvSpPr>
+          <p:cNvPr id="115" name="TextBox 114">
+            <a:extLst>
+              <a:ext uri="{FF2B5EF4-FFF2-40B4-BE49-F238E27FC236}">
+                <a16:creationId xmlns:a16="http://schemas.microsoft.com/office/drawing/2014/main" id="{D434F3BE-F9E4-E647-AA72-8A5FCBD57423}"/>
+              </a:ext>
+            </a:extLst>
+          </p:cNvPr>
+          <p:cNvSpPr txBox="1"/>
+          <p:nvPr/>
+        </p:nvSpPr>
+        <p:spPr>
+          <a:xfrm>
+            <a:off x="3123221" y="4428229"/>
+            <a:ext cx="2351608" cy="276999"/>
+          </a:xfrm>
+          <a:prstGeom prst="rect">
+            <a:avLst/>
+          </a:prstGeom>
+          <a:noFill/>
+        </p:spPr>
+        <p:txBody>
+          <a:bodyPr wrap="square" rtlCol="0">
+            <a:spAutoFit/>
+          </a:bodyPr>
+          <a:lstStyle/>
+          <a:p>
+            <a:r>
+              <a:rPr lang="en-US" sz="1200" dirty="0"/>
+              <a:t>[ITI-xx] SVCM </a:t>
+            </a:r>
+            <a:r>
+              <a:rPr lang="en-US" sz="1200" dirty="0" err="1"/>
+              <a:t>Qry</a:t>
+            </a:r>
+            <a:endParaRPr lang="en-US" sz="1200" dirty="0"/>
+          </a:p>
+        </p:txBody>
+      </p:sp>
+      <p:cxnSp>
+        <p:nvCxnSpPr>
+          <p:cNvPr id="128" name="Straight Arrow Connector 127">
+            <a:extLst>
+              <a:ext uri="{FF2B5EF4-FFF2-40B4-BE49-F238E27FC236}">
+                <a16:creationId xmlns:a16="http://schemas.microsoft.com/office/drawing/2014/main" id="{B9F69C1C-9C3C-BF45-90CE-79533713B380}"/>
+              </a:ext>
+            </a:extLst>
+          </p:cNvPr>
+          <p:cNvCxnSpPr>
+            <a:cxnSpLocks/>
+          </p:cNvCxnSpPr>
+          <p:nvPr/>
+        </p:nvCxnSpPr>
+        <p:spPr>
+          <a:xfrm>
+            <a:off x="2894688" y="5152040"/>
+            <a:ext cx="393129" cy="362896"/>
+          </a:xfrm>
+          <a:prstGeom prst="straightConnector1">
+            <a:avLst/>
+          </a:prstGeom>
+          <a:ln w="12700">
+            <a:solidFill>
+              <a:schemeClr val="tx1"/>
+            </a:solidFill>
+            <a:tailEnd type="triangle" w="lg" len="med"/>
+          </a:ln>
+        </p:spPr>
+        <p:style>
+          <a:lnRef idx="1">
+            <a:schemeClr val="accent1"/>
+          </a:lnRef>
+          <a:fillRef idx="0">
+            <a:schemeClr val="accent1"/>
+          </a:fillRef>
+          <a:effectRef idx="0">
+            <a:schemeClr val="accent1"/>
+          </a:effectRef>
+          <a:fontRef idx="minor">
+            <a:schemeClr val="tx1"/>
+          </a:fontRef>
+        </p:style>
+      </p:cxnSp>
+      <p:cxnSp>
+        <p:nvCxnSpPr>
+          <p:cNvPr id="138" name="Straight Arrow Connector 137">
+            <a:extLst>
+              <a:ext uri="{FF2B5EF4-FFF2-40B4-BE49-F238E27FC236}">
+                <a16:creationId xmlns:a16="http://schemas.microsoft.com/office/drawing/2014/main" id="{248B6CEC-51A8-E34C-8C07-B9E40A56D947}"/>
+              </a:ext>
+            </a:extLst>
+          </p:cNvPr>
+          <p:cNvCxnSpPr>
+            <a:cxnSpLocks/>
+          </p:cNvCxnSpPr>
+          <p:nvPr/>
+        </p:nvCxnSpPr>
+        <p:spPr>
+          <a:xfrm flipH="1">
+            <a:off x="8620280" y="5368923"/>
+            <a:ext cx="293394" cy="297588"/>
+          </a:xfrm>
+          <a:prstGeom prst="straightConnector1">
+            <a:avLst/>
+          </a:prstGeom>
+          <a:ln w="12700">
+            <a:solidFill>
+              <a:schemeClr val="tx1"/>
+            </a:solidFill>
+            <a:tailEnd type="triangle" w="lg" len="med"/>
+          </a:ln>
+        </p:spPr>
+        <p:style>
+          <a:lnRef idx="1">
+            <a:schemeClr val="accent1"/>
+          </a:lnRef>
+          <a:fillRef idx="0">
+            <a:schemeClr val="accent1"/>
+          </a:fillRef>
+          <a:effectRef idx="0">
+            <a:schemeClr val="accent1"/>
+          </a:effectRef>
+          <a:fontRef idx="minor">
+            <a:schemeClr val="tx1"/>
+          </a:fontRef>
+        </p:style>
+      </p:cxnSp>
+      <p:sp>
+        <p:nvSpPr>
+          <p:cNvPr id="139" name="TextBox 138">
+            <a:extLst>
+              <a:ext uri="{FF2B5EF4-FFF2-40B4-BE49-F238E27FC236}">
+                <a16:creationId xmlns:a16="http://schemas.microsoft.com/office/drawing/2014/main" id="{F3C2D349-356B-F24E-8EFE-BBE4F7B46638}"/>
+              </a:ext>
+            </a:extLst>
+          </p:cNvPr>
+          <p:cNvSpPr txBox="1"/>
+          <p:nvPr/>
+        </p:nvSpPr>
+        <p:spPr>
+          <a:xfrm>
+            <a:off x="7984172" y="5475341"/>
+            <a:ext cx="1154624" cy="646331"/>
+          </a:xfrm>
+          <a:prstGeom prst="rect">
+            <a:avLst/>
+          </a:prstGeom>
+          <a:noFill/>
+        </p:spPr>
+        <p:txBody>
+          <a:bodyPr wrap="square" rtlCol="0">
+            <a:spAutoFit/>
+          </a:bodyPr>
+          <a:lstStyle/>
+          <a:p>
+            <a:r>
+              <a:rPr lang="en-US" sz="1200" dirty="0"/>
+              <a:t>… ITI-19] </a:t>
+            </a:r>
+            <a:br>
+              <a:rPr lang="en-US" sz="1200" dirty="0"/>
+            </a:br>
+            <a:r>
+              <a:rPr lang="en-US" sz="1200" dirty="0"/>
+              <a:t>Authenticate </a:t>
+            </a:r>
+          </a:p>
+          <a:p>
+            <a:r>
+              <a:rPr lang="en-US" sz="1200" dirty="0"/>
+              <a:t>Node</a:t>
+            </a:r>
+          </a:p>
+        </p:txBody>
+      </p:sp>
     </p:spTree>
     <p:extLst>
       <p:ext uri="{BB962C8B-B14F-4D97-AF65-F5344CB8AC3E}">
-        <p14:creationId xmlns:p14="http://schemas.microsoft.com/office/powerpoint/2010/main" val="2163579843"/>
+        <p14:creationId xmlns:p14="http://schemas.microsoft.com/office/powerpoint/2010/main" val="1090947788"/>
       </p:ext>
     </p:extLst>
   </p:cSld>

</xml_diff>

<commit_message>
update 2 from second ITI Tech virtual-face-to-face session
</commit_message>
<xml_diff>
--- a/MHDS/MHDS-alt-actorDiagram-and-processFlows.pptx
+++ b/MHDS/MHDS-alt-actorDiagram-and-processFlows.pptx
@@ -5,7 +5,7 @@
     <p:sldMasterId id="2147483648" r:id="rId1"/>
   </p:sldMasterIdLst>
   <p:notesMasterIdLst>
-    <p:notesMasterId r:id="rId10"/>
+    <p:notesMasterId r:id="rId11"/>
   </p:notesMasterIdLst>
   <p:sldIdLst>
     <p:sldId id="265" r:id="rId2"/>
@@ -16,6 +16,7 @@
     <p:sldId id="263" r:id="rId7"/>
     <p:sldId id="259" r:id="rId8"/>
     <p:sldId id="262" r:id="rId9"/>
+    <p:sldId id="336" r:id="rId10"/>
   </p:sldIdLst>
   <p:sldSz cx="12192000" cy="6858000"/>
   <p:notesSz cx="6858000" cy="9144000"/>
@@ -204,7 +205,7 @@
           <a:p>
             <a:fld id="{B6E70393-9288-DD48-A766-CD327F7EE613}" type="datetimeFigureOut">
               <a:rPr lang="en-US" smtClean="0"/>
-              <a:t>2/21/2020</a:t>
+              <a:t>5/4/2020</a:t>
             </a:fld>
             <a:endParaRPr lang="en-US"/>
           </a:p>
@@ -702,7 +703,7 @@
           <a:p>
             <a:fld id="{4E390601-3E07-CF42-B623-D8BE419A4B6C}" type="datetimeFigureOut">
               <a:rPr lang="en-US" smtClean="0"/>
-              <a:t>2/21/2020</a:t>
+              <a:t>5/4/2020</a:t>
             </a:fld>
             <a:endParaRPr lang="en-US"/>
           </a:p>
@@ -900,7 +901,7 @@
           <a:p>
             <a:fld id="{4E390601-3E07-CF42-B623-D8BE419A4B6C}" type="datetimeFigureOut">
               <a:rPr lang="en-US" smtClean="0"/>
-              <a:t>2/21/2020</a:t>
+              <a:t>5/4/2020</a:t>
             </a:fld>
             <a:endParaRPr lang="en-US"/>
           </a:p>
@@ -1108,7 +1109,7 @@
           <a:p>
             <a:fld id="{4E390601-3E07-CF42-B623-D8BE419A4B6C}" type="datetimeFigureOut">
               <a:rPr lang="en-US" smtClean="0"/>
-              <a:t>2/21/2020</a:t>
+              <a:t>5/4/2020</a:t>
             </a:fld>
             <a:endParaRPr lang="en-US"/>
           </a:p>
@@ -1306,7 +1307,7 @@
           <a:p>
             <a:fld id="{4E390601-3E07-CF42-B623-D8BE419A4B6C}" type="datetimeFigureOut">
               <a:rPr lang="en-US" smtClean="0"/>
-              <a:t>2/21/2020</a:t>
+              <a:t>5/4/2020</a:t>
             </a:fld>
             <a:endParaRPr lang="en-US"/>
           </a:p>
@@ -1581,7 +1582,7 @@
           <a:p>
             <a:fld id="{4E390601-3E07-CF42-B623-D8BE419A4B6C}" type="datetimeFigureOut">
               <a:rPr lang="en-US" smtClean="0"/>
-              <a:t>2/21/2020</a:t>
+              <a:t>5/4/2020</a:t>
             </a:fld>
             <a:endParaRPr lang="en-US"/>
           </a:p>
@@ -1846,7 +1847,7 @@
           <a:p>
             <a:fld id="{4E390601-3E07-CF42-B623-D8BE419A4B6C}" type="datetimeFigureOut">
               <a:rPr lang="en-US" smtClean="0"/>
-              <a:t>2/21/2020</a:t>
+              <a:t>5/4/2020</a:t>
             </a:fld>
             <a:endParaRPr lang="en-US"/>
           </a:p>
@@ -2258,7 +2259,7 @@
           <a:p>
             <a:fld id="{4E390601-3E07-CF42-B623-D8BE419A4B6C}" type="datetimeFigureOut">
               <a:rPr lang="en-US" smtClean="0"/>
-              <a:t>2/21/2020</a:t>
+              <a:t>5/4/2020</a:t>
             </a:fld>
             <a:endParaRPr lang="en-US"/>
           </a:p>
@@ -2399,7 +2400,7 @@
           <a:p>
             <a:fld id="{4E390601-3E07-CF42-B623-D8BE419A4B6C}" type="datetimeFigureOut">
               <a:rPr lang="en-US" smtClean="0"/>
-              <a:t>2/21/2020</a:t>
+              <a:t>5/4/2020</a:t>
             </a:fld>
             <a:endParaRPr lang="en-US"/>
           </a:p>
@@ -2512,7 +2513,7 @@
           <a:p>
             <a:fld id="{4E390601-3E07-CF42-B623-D8BE419A4B6C}" type="datetimeFigureOut">
               <a:rPr lang="en-US" smtClean="0"/>
-              <a:t>2/21/2020</a:t>
+              <a:t>5/4/2020</a:t>
             </a:fld>
             <a:endParaRPr lang="en-US"/>
           </a:p>
@@ -2823,7 +2824,7 @@
           <a:p>
             <a:fld id="{4E390601-3E07-CF42-B623-D8BE419A4B6C}" type="datetimeFigureOut">
               <a:rPr lang="en-US" smtClean="0"/>
-              <a:t>2/21/2020</a:t>
+              <a:t>5/4/2020</a:t>
             </a:fld>
             <a:endParaRPr lang="en-US"/>
           </a:p>
@@ -3111,7 +3112,7 @@
           <a:p>
             <a:fld id="{4E390601-3E07-CF42-B623-D8BE419A4B6C}" type="datetimeFigureOut">
               <a:rPr lang="en-US" smtClean="0"/>
-              <a:t>2/21/2020</a:t>
+              <a:t>5/4/2020</a:t>
             </a:fld>
             <a:endParaRPr lang="en-US"/>
           </a:p>
@@ -3352,7 +3353,7 @@
           <a:p>
             <a:fld id="{4E390601-3E07-CF42-B623-D8BE419A4B6C}" type="datetimeFigureOut">
               <a:rPr lang="en-US" smtClean="0"/>
-              <a:t>2/21/2020</a:t>
+              <a:t>5/4/2020</a:t>
             </a:fld>
             <a:endParaRPr lang="en-US"/>
           </a:p>
@@ -19939,6 +19940,9 @@
             <a:chOff x="493249" y="1193092"/>
             <a:chExt cx="2752223" cy="3109160"/>
           </a:xfrm>
+          <a:solidFill>
+            <a:srgbClr val="E2F0D9"/>
+          </a:solidFill>
         </p:grpSpPr>
         <p:grpSp>
           <p:nvGrpSpPr>
@@ -19959,6 +19963,7 @@
               <a:chOff x="480128" y="540384"/>
               <a:chExt cx="2752223" cy="2315256"/>
             </a:xfrm>
+            <a:grpFill/>
           </p:grpSpPr>
           <p:sp>
             <p:nvSpPr>
@@ -19980,12 +19985,7 @@
               <a:prstGeom prst="roundRect">
                 <a:avLst/>
               </a:prstGeom>
-              <a:solidFill>
-                <a:schemeClr val="accent6">
-                  <a:lumMod val="20000"/>
-                  <a:lumOff val="80000"/>
-                </a:schemeClr>
-              </a:solidFill>
+              <a:grpFill/>
               <a:ln>
                 <a:solidFill>
                   <a:schemeClr val="tx1">
@@ -20040,7 +20040,7 @@
               <a:prstGeom prst="rect">
                 <a:avLst/>
               </a:prstGeom>
-              <a:noFill/>
+              <a:grpFill/>
             </p:spPr>
             <p:txBody>
               <a:bodyPr wrap="square" rtlCol="0">
@@ -20077,7 +20077,7 @@
             <a:prstGeom prst="rect">
               <a:avLst/>
             </a:prstGeom>
-            <a:noFill/>
+            <a:grpFill/>
             <a:ln w="12700">
               <a:solidFill>
                 <a:schemeClr val="tx1"/>
@@ -20118,7 +20118,7 @@
             <a:prstGeom prst="rect">
               <a:avLst/>
             </a:prstGeom>
-            <a:noFill/>
+            <a:grpFill/>
             <a:ln w="12700">
               <a:solidFill>
                 <a:schemeClr val="tx1"/>
@@ -20165,7 +20165,7 @@
             <a:prstGeom prst="rect">
               <a:avLst/>
             </a:prstGeom>
-            <a:noFill/>
+            <a:grpFill/>
             <a:ln w="12700">
               <a:solidFill>
                 <a:schemeClr val="tx1"/>
@@ -20212,7 +20212,7 @@
             <a:prstGeom prst="rect">
               <a:avLst/>
             </a:prstGeom>
-            <a:noFill/>
+            <a:grpFill/>
             <a:ln w="12700">
               <a:solidFill>
                 <a:schemeClr val="tx1"/>
@@ -20289,7 +20289,7 @@
             <a:prstGeom prst="rect">
               <a:avLst/>
             </a:prstGeom>
-            <a:noFill/>
+            <a:grpFill/>
             <a:ln w="12700">
               <a:solidFill>
                 <a:schemeClr val="tx1"/>
@@ -20336,7 +20336,7 @@
             <a:prstGeom prst="rect">
               <a:avLst/>
             </a:prstGeom>
-            <a:noFill/>
+            <a:grpFill/>
             <a:ln w="12700">
               <a:solidFill>
                 <a:schemeClr val="tx1"/>
@@ -20383,7 +20383,7 @@
             <a:prstGeom prst="rect">
               <a:avLst/>
             </a:prstGeom>
-            <a:noFill/>
+            <a:grpFill/>
             <a:ln w="12700">
               <a:solidFill>
                 <a:schemeClr val="tx1"/>
@@ -21125,11 +21125,14 @@
         </p:nvGrpSpPr>
         <p:grpSpPr>
           <a:xfrm>
-            <a:off x="5154145" y="596198"/>
-            <a:ext cx="2610652" cy="3945984"/>
+            <a:off x="5015345" y="415636"/>
+            <a:ext cx="2749452" cy="4126546"/>
             <a:chOff x="4741191" y="1144838"/>
             <a:chExt cx="2610652" cy="3945984"/>
           </a:xfrm>
+          <a:solidFill>
+            <a:srgbClr val="FFF2CC"/>
+          </a:solidFill>
         </p:grpSpPr>
         <p:sp>
           <p:nvSpPr>
@@ -21151,12 +21154,7 @@
             <a:prstGeom prst="roundRect">
               <a:avLst/>
             </a:prstGeom>
-            <a:solidFill>
-              <a:schemeClr val="accent4">
-                <a:lumMod val="20000"/>
-                <a:lumOff val="80000"/>
-              </a:schemeClr>
-            </a:solidFill>
+            <a:grpFill/>
             <a:ln>
               <a:solidFill>
                 <a:schemeClr val="tx1">
@@ -21211,7 +21209,7 @@
             <a:prstGeom prst="rect">
               <a:avLst/>
             </a:prstGeom>
-            <a:noFill/>
+            <a:grpFill/>
             <a:ln w="12700">
               <a:solidFill>
                 <a:schemeClr val="tx1"/>
@@ -21252,7 +21250,7 @@
             <a:prstGeom prst="rect">
               <a:avLst/>
             </a:prstGeom>
-            <a:noFill/>
+            <a:grpFill/>
             <a:ln w="12700">
               <a:solidFill>
                 <a:schemeClr val="tx1"/>
@@ -21299,7 +21297,7 @@
             <a:prstGeom prst="rect">
               <a:avLst/>
             </a:prstGeom>
-            <a:noFill/>
+            <a:grpFill/>
             <a:ln w="12700">
               <a:solidFill>
                 <a:schemeClr val="tx1"/>
@@ -21356,7 +21354,7 @@
             <a:prstGeom prst="rect">
               <a:avLst/>
             </a:prstGeom>
-            <a:noFill/>
+            <a:grpFill/>
             <a:ln w="12700">
               <a:solidFill>
                 <a:schemeClr val="tx1"/>
@@ -21397,7 +21395,7 @@
             <a:prstGeom prst="rect">
               <a:avLst/>
             </a:prstGeom>
-            <a:noFill/>
+            <a:grpFill/>
             <a:ln w="12700">
               <a:solidFill>
                 <a:schemeClr val="tx1"/>
@@ -21444,7 +21442,7 @@
             <a:prstGeom prst="rect">
               <a:avLst/>
             </a:prstGeom>
-            <a:noFill/>
+            <a:grpFill/>
             <a:ln w="12700">
               <a:solidFill>
                 <a:schemeClr val="tx1"/>
@@ -21485,7 +21483,7 @@
             <a:prstGeom prst="rect">
               <a:avLst/>
             </a:prstGeom>
-            <a:noFill/>
+            <a:grpFill/>
           </p:spPr>
           <p:txBody>
             <a:bodyPr wrap="none" rtlCol="0">
@@ -22101,6 +22099,352 @@
     <p:extLst>
       <p:ext uri="{BB962C8B-B14F-4D97-AF65-F5344CB8AC3E}">
         <p14:creationId xmlns:p14="http://schemas.microsoft.com/office/powerpoint/2010/main" val="749340636"/>
+      </p:ext>
+    </p:extLst>
+  </p:cSld>
+  <p:clrMapOvr>
+    <a:masterClrMapping/>
+  </p:clrMapOvr>
+</p:sld>
+</file>
+
+<file path=ppt/slides/slide9.xml><?xml version="1.0" encoding="utf-8"?>
+<p:sld xmlns:a="http://schemas.openxmlformats.org/drawingml/2006/main" xmlns:r="http://schemas.openxmlformats.org/officeDocument/2006/relationships" xmlns:p="http://schemas.openxmlformats.org/presentationml/2006/main">
+  <p:cSld>
+    <p:spTree>
+      <p:nvGrpSpPr>
+        <p:cNvPr id="1" name=""/>
+        <p:cNvGrpSpPr/>
+        <p:nvPr/>
+      </p:nvGrpSpPr>
+      <p:grpSpPr>
+        <a:xfrm>
+          <a:off x="0" y="0"/>
+          <a:ext cx="0" cy="0"/>
+          <a:chOff x="0" y="0"/>
+          <a:chExt cx="0" cy="0"/>
+        </a:xfrm>
+      </p:grpSpPr>
+      <p:sp>
+        <p:nvSpPr>
+          <p:cNvPr id="2" name="Rectangle: Rounded Corners 1">
+            <a:extLst>
+              <a:ext uri="{FF2B5EF4-FFF2-40B4-BE49-F238E27FC236}">
+                <a16:creationId xmlns:a16="http://schemas.microsoft.com/office/drawing/2014/main" id="{20288A24-6DAD-4C09-B6A5-8549E428B7A3}"/>
+              </a:ext>
+            </a:extLst>
+          </p:cNvPr>
+          <p:cNvSpPr/>
+          <p:nvPr/>
+        </p:nvSpPr>
+        <p:spPr>
+          <a:xfrm>
+            <a:off x="4636710" y="1165070"/>
+            <a:ext cx="2873056" cy="2046279"/>
+          </a:xfrm>
+          <a:prstGeom prst="roundRect">
+            <a:avLst/>
+          </a:prstGeom>
+          <a:solidFill>
+            <a:srgbClr val="FFF2CC"/>
+          </a:solidFill>
+        </p:spPr>
+        <p:style>
+          <a:lnRef idx="2">
+            <a:schemeClr val="accent1">
+              <a:shade val="50000"/>
+            </a:schemeClr>
+          </a:lnRef>
+          <a:fillRef idx="1">
+            <a:schemeClr val="accent1"/>
+          </a:fillRef>
+          <a:effectRef idx="0">
+            <a:schemeClr val="accent1"/>
+          </a:effectRef>
+          <a:fontRef idx="minor">
+            <a:schemeClr val="lt1"/>
+          </a:fontRef>
+        </p:style>
+        <p:txBody>
+          <a:bodyPr rtlCol="0" anchor="ctr"/>
+          <a:lstStyle/>
+          <a:p>
+            <a:pPr algn="ctr"/>
+            <a:r>
+              <a:rPr lang="en-US" sz="3200" dirty="0">
+                <a:solidFill>
+                  <a:schemeClr val="tx1"/>
+                </a:solidFill>
+              </a:rPr>
+              <a:t>HIE Central Infrastructure</a:t>
+            </a:r>
+          </a:p>
+        </p:txBody>
+      </p:sp>
+      <p:sp>
+        <p:nvSpPr>
+          <p:cNvPr id="3" name="Rectangle: Rounded Corners 2">
+            <a:extLst>
+              <a:ext uri="{FF2B5EF4-FFF2-40B4-BE49-F238E27FC236}">
+                <a16:creationId xmlns:a16="http://schemas.microsoft.com/office/drawing/2014/main" id="{CBA4CBFE-CA14-46CD-9CC8-B05F5F8D4822}"/>
+              </a:ext>
+            </a:extLst>
+          </p:cNvPr>
+          <p:cNvSpPr/>
+          <p:nvPr/>
+        </p:nvSpPr>
+        <p:spPr>
+          <a:xfrm>
+            <a:off x="4636710" y="3897320"/>
+            <a:ext cx="2873056" cy="2046279"/>
+          </a:xfrm>
+          <a:prstGeom prst="roundRect">
+            <a:avLst/>
+          </a:prstGeom>
+          <a:solidFill>
+            <a:schemeClr val="bg1"/>
+          </a:solidFill>
+        </p:spPr>
+        <p:style>
+          <a:lnRef idx="2">
+            <a:schemeClr val="accent1">
+              <a:shade val="50000"/>
+            </a:schemeClr>
+          </a:lnRef>
+          <a:fillRef idx="1">
+            <a:schemeClr val="accent1"/>
+          </a:fillRef>
+          <a:effectRef idx="0">
+            <a:schemeClr val="accent1"/>
+          </a:effectRef>
+          <a:fontRef idx="minor">
+            <a:schemeClr val="lt1"/>
+          </a:fontRef>
+        </p:style>
+        <p:txBody>
+          <a:bodyPr rtlCol="0" anchor="ctr"/>
+          <a:lstStyle/>
+          <a:p>
+            <a:pPr algn="ctr"/>
+            <a:r>
+              <a:rPr lang="en-US" sz="3200" dirty="0">
+                <a:solidFill>
+                  <a:schemeClr val="tx1"/>
+                </a:solidFill>
+              </a:rPr>
+              <a:t>MHDS Document Registry</a:t>
+            </a:r>
+          </a:p>
+        </p:txBody>
+      </p:sp>
+      <p:sp>
+        <p:nvSpPr>
+          <p:cNvPr id="4" name="Rectangle: Rounded Corners 3">
+            <a:extLst>
+              <a:ext uri="{FF2B5EF4-FFF2-40B4-BE49-F238E27FC236}">
+                <a16:creationId xmlns:a16="http://schemas.microsoft.com/office/drawing/2014/main" id="{30DB2080-D0EF-4336-8E2A-9238C886FEB3}"/>
+              </a:ext>
+            </a:extLst>
+          </p:cNvPr>
+          <p:cNvSpPr/>
+          <p:nvPr/>
+        </p:nvSpPr>
+        <p:spPr>
+          <a:xfrm>
+            <a:off x="731783" y="2562919"/>
+            <a:ext cx="2873056" cy="2046279"/>
+          </a:xfrm>
+          <a:prstGeom prst="roundRect">
+            <a:avLst/>
+          </a:prstGeom>
+          <a:solidFill>
+            <a:srgbClr val="E2F0D9"/>
+          </a:solidFill>
+        </p:spPr>
+        <p:style>
+          <a:lnRef idx="2">
+            <a:schemeClr val="accent1">
+              <a:shade val="50000"/>
+            </a:schemeClr>
+          </a:lnRef>
+          <a:fillRef idx="1">
+            <a:schemeClr val="accent1"/>
+          </a:fillRef>
+          <a:effectRef idx="0">
+            <a:schemeClr val="accent1"/>
+          </a:effectRef>
+          <a:fontRef idx="minor">
+            <a:schemeClr val="lt1"/>
+          </a:fontRef>
+        </p:style>
+        <p:txBody>
+          <a:bodyPr rtlCol="0" anchor="ctr"/>
+          <a:lstStyle/>
+          <a:p>
+            <a:pPr algn="ctr"/>
+            <a:r>
+              <a:rPr lang="en-US" sz="3200" dirty="0">
+                <a:solidFill>
+                  <a:schemeClr val="tx1"/>
+                </a:solidFill>
+              </a:rPr>
+              <a:t>System that publishes documents</a:t>
+            </a:r>
+          </a:p>
+        </p:txBody>
+      </p:sp>
+      <p:sp>
+        <p:nvSpPr>
+          <p:cNvPr id="5" name="Rectangle: Rounded Corners 4">
+            <a:extLst>
+              <a:ext uri="{FF2B5EF4-FFF2-40B4-BE49-F238E27FC236}">
+                <a16:creationId xmlns:a16="http://schemas.microsoft.com/office/drawing/2014/main" id="{B19DCF15-C5EF-4610-9686-EB3BCD387D78}"/>
+              </a:ext>
+            </a:extLst>
+          </p:cNvPr>
+          <p:cNvSpPr/>
+          <p:nvPr/>
+        </p:nvSpPr>
+        <p:spPr>
+          <a:xfrm>
+            <a:off x="8587161" y="2562917"/>
+            <a:ext cx="2873056" cy="2046279"/>
+          </a:xfrm>
+          <a:prstGeom prst="roundRect">
+            <a:avLst/>
+          </a:prstGeom>
+          <a:solidFill>
+            <a:srgbClr val="E2F0D9"/>
+          </a:solidFill>
+        </p:spPr>
+        <p:style>
+          <a:lnRef idx="2">
+            <a:schemeClr val="accent1">
+              <a:shade val="50000"/>
+            </a:schemeClr>
+          </a:lnRef>
+          <a:fillRef idx="1">
+            <a:schemeClr val="accent1"/>
+          </a:fillRef>
+          <a:effectRef idx="0">
+            <a:schemeClr val="accent1"/>
+          </a:effectRef>
+          <a:fontRef idx="minor">
+            <a:schemeClr val="lt1"/>
+          </a:fontRef>
+        </p:style>
+        <p:txBody>
+          <a:bodyPr rtlCol="0" anchor="ctr"/>
+          <a:lstStyle/>
+          <a:p>
+            <a:pPr algn="ctr"/>
+            <a:r>
+              <a:rPr lang="en-US" sz="3200" dirty="0">
+                <a:solidFill>
+                  <a:schemeClr val="tx1"/>
+                </a:solidFill>
+              </a:rPr>
+              <a:t>System that consumes documents</a:t>
+            </a:r>
+          </a:p>
+        </p:txBody>
+      </p:sp>
+      <p:sp>
+        <p:nvSpPr>
+          <p:cNvPr id="6" name="Arrow: Right 5">
+            <a:extLst>
+              <a:ext uri="{FF2B5EF4-FFF2-40B4-BE49-F238E27FC236}">
+                <a16:creationId xmlns:a16="http://schemas.microsoft.com/office/drawing/2014/main" id="{823BCADE-13DE-4E83-A04F-102F33413610}"/>
+              </a:ext>
+            </a:extLst>
+          </p:cNvPr>
+          <p:cNvSpPr/>
+          <p:nvPr/>
+        </p:nvSpPr>
+        <p:spPr>
+          <a:xfrm>
+            <a:off x="3604839" y="2188209"/>
+            <a:ext cx="778673" cy="2809529"/>
+          </a:xfrm>
+          <a:prstGeom prst="rightArrow">
+            <a:avLst/>
+          </a:prstGeom>
+        </p:spPr>
+        <p:style>
+          <a:lnRef idx="2">
+            <a:schemeClr val="accent1">
+              <a:shade val="50000"/>
+            </a:schemeClr>
+          </a:lnRef>
+          <a:fillRef idx="1">
+            <a:schemeClr val="accent1"/>
+          </a:fillRef>
+          <a:effectRef idx="0">
+            <a:schemeClr val="accent1"/>
+          </a:effectRef>
+          <a:fontRef idx="minor">
+            <a:schemeClr val="lt1"/>
+          </a:fontRef>
+        </p:style>
+        <p:txBody>
+          <a:bodyPr rtlCol="0" anchor="ctr"/>
+          <a:lstStyle/>
+          <a:p>
+            <a:pPr algn="ctr"/>
+            <a:endParaRPr lang="en-US"/>
+          </a:p>
+        </p:txBody>
+      </p:sp>
+      <p:sp>
+        <p:nvSpPr>
+          <p:cNvPr id="7" name="Arrow: Right 6">
+            <a:extLst>
+              <a:ext uri="{FF2B5EF4-FFF2-40B4-BE49-F238E27FC236}">
+                <a16:creationId xmlns:a16="http://schemas.microsoft.com/office/drawing/2014/main" id="{10536F6E-50A3-4D51-8D10-473E5DB06788}"/>
+              </a:ext>
+            </a:extLst>
+          </p:cNvPr>
+          <p:cNvSpPr/>
+          <p:nvPr/>
+        </p:nvSpPr>
+        <p:spPr>
+          <a:xfrm>
+            <a:off x="7762963" y="2104015"/>
+            <a:ext cx="778673" cy="2809529"/>
+          </a:xfrm>
+          <a:prstGeom prst="rightArrow">
+            <a:avLst/>
+          </a:prstGeom>
+        </p:spPr>
+        <p:style>
+          <a:lnRef idx="2">
+            <a:schemeClr val="accent1">
+              <a:shade val="50000"/>
+            </a:schemeClr>
+          </a:lnRef>
+          <a:fillRef idx="1">
+            <a:schemeClr val="accent1"/>
+          </a:fillRef>
+          <a:effectRef idx="0">
+            <a:schemeClr val="accent1"/>
+          </a:effectRef>
+          <a:fontRef idx="minor">
+            <a:schemeClr val="lt1"/>
+          </a:fontRef>
+        </p:style>
+        <p:txBody>
+          <a:bodyPr rtlCol="0" anchor="ctr"/>
+          <a:lstStyle/>
+          <a:p>
+            <a:pPr algn="ctr"/>
+            <a:endParaRPr lang="en-US"/>
+          </a:p>
+        </p:txBody>
+      </p:sp>
+    </p:spTree>
+    <p:extLst>
+      <p:ext uri="{BB962C8B-B14F-4D97-AF65-F5344CB8AC3E}">
+        <p14:creationId xmlns:p14="http://schemas.microsoft.com/office/powerpoint/2010/main" val="2847421086"/>
       </p:ext>
     </p:extLst>
   </p:cSld>

</xml_diff>

<commit_message>
fixed SVCM references in complex diagram, all graphics from one PPT
</commit_message>
<xml_diff>
--- a/MHDS/MHDS-alt-actorDiagram-and-processFlows.pptx
+++ b/MHDS/MHDS-alt-actorDiagram-and-processFlows.pptx
@@ -205,7 +205,7 @@
           <a:p>
             <a:fld id="{B6E70393-9288-DD48-A766-CD327F7EE613}" type="datetimeFigureOut">
               <a:rPr lang="en-US" smtClean="0"/>
-              <a:t>5/4/2020</a:t>
+              <a:t>5/8/2020</a:t>
             </a:fld>
             <a:endParaRPr lang="en-US"/>
           </a:p>
@@ -703,7 +703,7 @@
           <a:p>
             <a:fld id="{4E390601-3E07-CF42-B623-D8BE419A4B6C}" type="datetimeFigureOut">
               <a:rPr lang="en-US" smtClean="0"/>
-              <a:t>5/4/2020</a:t>
+              <a:t>5/8/2020</a:t>
             </a:fld>
             <a:endParaRPr lang="en-US"/>
           </a:p>
@@ -901,7 +901,7 @@
           <a:p>
             <a:fld id="{4E390601-3E07-CF42-B623-D8BE419A4B6C}" type="datetimeFigureOut">
               <a:rPr lang="en-US" smtClean="0"/>
-              <a:t>5/4/2020</a:t>
+              <a:t>5/8/2020</a:t>
             </a:fld>
             <a:endParaRPr lang="en-US"/>
           </a:p>
@@ -1109,7 +1109,7 @@
           <a:p>
             <a:fld id="{4E390601-3E07-CF42-B623-D8BE419A4B6C}" type="datetimeFigureOut">
               <a:rPr lang="en-US" smtClean="0"/>
-              <a:t>5/4/2020</a:t>
+              <a:t>5/8/2020</a:t>
             </a:fld>
             <a:endParaRPr lang="en-US"/>
           </a:p>
@@ -1307,7 +1307,7 @@
           <a:p>
             <a:fld id="{4E390601-3E07-CF42-B623-D8BE419A4B6C}" type="datetimeFigureOut">
               <a:rPr lang="en-US" smtClean="0"/>
-              <a:t>5/4/2020</a:t>
+              <a:t>5/8/2020</a:t>
             </a:fld>
             <a:endParaRPr lang="en-US"/>
           </a:p>
@@ -1582,7 +1582,7 @@
           <a:p>
             <a:fld id="{4E390601-3E07-CF42-B623-D8BE419A4B6C}" type="datetimeFigureOut">
               <a:rPr lang="en-US" smtClean="0"/>
-              <a:t>5/4/2020</a:t>
+              <a:t>5/8/2020</a:t>
             </a:fld>
             <a:endParaRPr lang="en-US"/>
           </a:p>
@@ -1847,7 +1847,7 @@
           <a:p>
             <a:fld id="{4E390601-3E07-CF42-B623-D8BE419A4B6C}" type="datetimeFigureOut">
               <a:rPr lang="en-US" smtClean="0"/>
-              <a:t>5/4/2020</a:t>
+              <a:t>5/8/2020</a:t>
             </a:fld>
             <a:endParaRPr lang="en-US"/>
           </a:p>
@@ -2259,7 +2259,7 @@
           <a:p>
             <a:fld id="{4E390601-3E07-CF42-B623-D8BE419A4B6C}" type="datetimeFigureOut">
               <a:rPr lang="en-US" smtClean="0"/>
-              <a:t>5/4/2020</a:t>
+              <a:t>5/8/2020</a:t>
             </a:fld>
             <a:endParaRPr lang="en-US"/>
           </a:p>
@@ -2400,7 +2400,7 @@
           <a:p>
             <a:fld id="{4E390601-3E07-CF42-B623-D8BE419A4B6C}" type="datetimeFigureOut">
               <a:rPr lang="en-US" smtClean="0"/>
-              <a:t>5/4/2020</a:t>
+              <a:t>5/8/2020</a:t>
             </a:fld>
             <a:endParaRPr lang="en-US"/>
           </a:p>
@@ -2513,7 +2513,7 @@
           <a:p>
             <a:fld id="{4E390601-3E07-CF42-B623-D8BE419A4B6C}" type="datetimeFigureOut">
               <a:rPr lang="en-US" smtClean="0"/>
-              <a:t>5/4/2020</a:t>
+              <a:t>5/8/2020</a:t>
             </a:fld>
             <a:endParaRPr lang="en-US"/>
           </a:p>
@@ -2824,7 +2824,7 @@
           <a:p>
             <a:fld id="{4E390601-3E07-CF42-B623-D8BE419A4B6C}" type="datetimeFigureOut">
               <a:rPr lang="en-US" smtClean="0"/>
-              <a:t>5/4/2020</a:t>
+              <a:t>5/8/2020</a:t>
             </a:fld>
             <a:endParaRPr lang="en-US"/>
           </a:p>
@@ -3112,7 +3112,7 @@
           <a:p>
             <a:fld id="{4E390601-3E07-CF42-B623-D8BE419A4B6C}" type="datetimeFigureOut">
               <a:rPr lang="en-US" smtClean="0"/>
-              <a:t>5/4/2020</a:t>
+              <a:t>5/8/2020</a:t>
             </a:fld>
             <a:endParaRPr lang="en-US"/>
           </a:p>
@@ -3353,7 +3353,7 @@
           <a:p>
             <a:fld id="{4E390601-3E07-CF42-B623-D8BE419A4B6C}" type="datetimeFigureOut">
               <a:rPr lang="en-US" smtClean="0"/>
-              <a:t>5/4/2020</a:t>
+              <a:t>5/8/2020</a:t>
             </a:fld>
             <a:endParaRPr lang="en-US"/>
           </a:p>
@@ -4877,8 +4877,8 @@
         </p:nvSpPr>
         <p:spPr>
           <a:xfrm>
-            <a:off x="7719716" y="3641921"/>
-            <a:ext cx="1128795" cy="646331"/>
+            <a:off x="7719716" y="3919021"/>
+            <a:ext cx="1128795" cy="276999"/>
           </a:xfrm>
           <a:prstGeom prst="rect">
             <a:avLst/>
@@ -4893,7 +4893,7 @@
           <a:p>
             <a:r>
               <a:rPr lang="en-US" sz="1200" dirty="0"/>
-              <a:t>[ITI-93] Mobile Patient Identity Feed</a:t>
+              <a:t>[ITI-93] Feed</a:t>
             </a:r>
           </a:p>
         </p:txBody>
@@ -4947,8 +4947,8 @@
         </p:nvSpPr>
         <p:spPr>
           <a:xfrm>
-            <a:off x="3105708" y="3872129"/>
-            <a:ext cx="1533552" cy="461665"/>
+            <a:off x="3105708" y="4024534"/>
+            <a:ext cx="1533552" cy="276999"/>
           </a:xfrm>
           <a:prstGeom prst="rect">
             <a:avLst/>
@@ -4963,23 +4963,7 @@
           <a:p>
             <a:r>
               <a:rPr lang="en-US" sz="1200" dirty="0"/>
-              <a:t>[ITI-78] or [ITI-83]  </a:t>
-            </a:r>
-            <a:r>
-              <a:rPr lang="en-US" sz="1200" dirty="0" err="1"/>
-              <a:t>PDQm</a:t>
-            </a:r>
-            <a:r>
-              <a:rPr lang="en-US" sz="1200" dirty="0"/>
-              <a:t> or </a:t>
-            </a:r>
-            <a:r>
-              <a:rPr lang="en-US" sz="1200" dirty="0" err="1"/>
-              <a:t>PIXm</a:t>
-            </a:r>
-            <a:r>
-              <a:rPr lang="en-US" sz="1200" dirty="0"/>
-              <a:t> Query</a:t>
+              <a:t>[ITI-78] or [ITI-83] </a:t>
             </a:r>
           </a:p>
         </p:txBody>
@@ -5049,13 +5033,8 @@
           <a:p>
             <a:r>
               <a:rPr lang="en-US" sz="1200" dirty="0"/>
-              <a:t>[ITI-xx] SVCM </a:t>
-            </a:r>
-            <a:r>
-              <a:rPr lang="en-US" sz="1200" dirty="0" err="1"/>
-              <a:t>Qry</a:t>
-            </a:r>
-            <a:endParaRPr lang="en-US" sz="1200" dirty="0"/>
+              <a:t>[ITI-95] – [ITI-101]</a:t>
+            </a:r>
           </a:p>
         </p:txBody>
       </p:sp>
@@ -6324,7 +6303,7 @@
           <a:p>
             <a:r>
               <a:rPr lang="en-US" sz="1200" dirty="0"/>
-              <a:t>[ITI-19]   [ITI-20]</a:t>
+              <a:t>[ITI-19] and [ITI-20]</a:t>
             </a:r>
           </a:p>
         </p:txBody>
@@ -6482,7 +6461,7 @@
           <a:p>
             <a:r>
               <a:rPr lang="en-US" sz="1200" dirty="0"/>
-              <a:t>[ITI-xx] SVCM Query</a:t>
+              <a:t>[ITI-95] – [ITI-101]</a:t>
             </a:r>
           </a:p>
         </p:txBody>
@@ -7173,13 +7152,8 @@
           <a:p>
             <a:r>
               <a:rPr lang="en-US" sz="1200" dirty="0"/>
-              <a:t>[ITI-xx] SVCM </a:t>
-            </a:r>
-            <a:r>
-              <a:rPr lang="en-US" sz="1200" dirty="0" err="1"/>
-              <a:t>Qry</a:t>
-            </a:r>
-            <a:endParaRPr lang="en-US" sz="1200" dirty="0"/>
+              <a:t>[ITI-95] – [ITI-101]</a:t>
+            </a:r>
           </a:p>
         </p:txBody>
       </p:sp>

</xml_diff>